<commit_message>
Presentation modified, conlusions added
</commit_message>
<xml_diff>
--- a/Prezentacja_Tester_Oprogramowania_Piotr_Zaguła.pptx
+++ b/Prezentacja_Tester_Oprogramowania_Piotr_Zaguła.pptx
@@ -5,7 +5,7 @@
     <p:sldMasterId id="2147483648" r:id="rId1"/>
   </p:sldMasterIdLst>
   <p:notesMasterIdLst>
-    <p:notesMasterId r:id="rId14"/>
+    <p:notesMasterId r:id="rId16"/>
   </p:notesMasterIdLst>
   <p:sldIdLst>
     <p:sldId id="257" r:id="rId2"/>
@@ -20,23 +20,25 @@
     <p:sldId id="269" r:id="rId11"/>
     <p:sldId id="270" r:id="rId12"/>
     <p:sldId id="271" r:id="rId13"/>
+    <p:sldId id="272" r:id="rId14"/>
+    <p:sldId id="273" r:id="rId15"/>
   </p:sldIdLst>
   <p:sldSz cx="12192000" cy="6858000"/>
   <p:notesSz cx="6858000" cy="9144000"/>
   <p:embeddedFontLst>
     <p:embeddedFont>
       <p:font typeface="Calibri" panose="020F0502020204030204" pitchFamily="34" charset="0"/>
-      <p:regular r:id="rId15"/>
-      <p:bold r:id="rId16"/>
-      <p:italic r:id="rId17"/>
-      <p:boldItalic r:id="rId18"/>
+      <p:regular r:id="rId17"/>
+      <p:bold r:id="rId18"/>
+      <p:italic r:id="rId19"/>
+      <p:boldItalic r:id="rId20"/>
     </p:embeddedFont>
     <p:embeddedFont>
       <p:font typeface="Poppins" panose="00000500000000000000" pitchFamily="2" charset="-18"/>
-      <p:regular r:id="rId19"/>
-      <p:bold r:id="rId20"/>
-      <p:italic r:id="rId21"/>
-      <p:boldItalic r:id="rId22"/>
+      <p:regular r:id="rId21"/>
+      <p:bold r:id="rId22"/>
+      <p:italic r:id="rId23"/>
+      <p:boldItalic r:id="rId24"/>
     </p:embeddedFont>
   </p:embeddedFontLst>
   <p:defaultTextStyle>
@@ -273,7 +275,7 @@
       <p15:sldGuideLst xmlns:p15="http://schemas.microsoft.com/office/powerpoint/2012/main"/>
     </p:ext>
     <p:ext uri="http://customooxmlschemas.google.com/">
-      <go:slidesCustomData xmlns="" xmlns:mc="http://schemas.openxmlformats.org/markup-compatibility/2006" xmlns:mv="urn:schemas-microsoft-com:mac:vml" xmlns:c="http://schemas.openxmlformats.org/drawingml/2006/chart" xmlns:dgm="http://schemas.openxmlformats.org/drawingml/2006/diagram" xmlns:o="urn:schemas-microsoft-com:office:office" xmlns:v="urn:schemas-microsoft-com:vml" xmlns:pvml="urn:schemas-microsoft-com:office:powerpoint" xmlns:com="http://schemas.openxmlformats.org/drawingml/2006/compatibility" xmlns:p14="http://schemas.microsoft.com/office/powerpoint/2010/main" xmlns:p15="http://schemas.microsoft.com/office/powerpoint/2012/main" xmlns:ahyp="http://schemas.microsoft.com/office/drawing/2018/hyperlinkcolor" xmlns:go="http://customooxmlschemas.google.com/" r:id="rId24" roundtripDataSignature="AMtx7miXMjpKdOZMbqgcJFAryASTqGq7bA=="/>
+      <go:slidesCustomData xmlns:go="http://customooxmlschemas.google.com/" xmlns:ahyp="http://schemas.microsoft.com/office/drawing/2018/hyperlinkcolor" xmlns:p15="http://schemas.microsoft.com/office/powerpoint/2012/main" xmlns:p14="http://schemas.microsoft.com/office/powerpoint/2010/main" xmlns:com="http://schemas.openxmlformats.org/drawingml/2006/compatibility" xmlns:pvml="urn:schemas-microsoft-com:office:powerpoint" xmlns:v="urn:schemas-microsoft-com:vml" xmlns:o="urn:schemas-microsoft-com:office:office" xmlns:dgm="http://schemas.openxmlformats.org/drawingml/2006/diagram" xmlns:c="http://schemas.openxmlformats.org/drawingml/2006/chart" xmlns:mv="urn:schemas-microsoft-com:mac:vml" xmlns:mc="http://schemas.openxmlformats.org/markup-compatibility/2006" xmlns="" r:id="rId25" roundtripDataSignature="AMtx7miXMjpKdOZMbqgcJFAryASTqGq7bA=="/>
     </p:ext>
   </p:extLst>
 </p:presentation>
@@ -1352,6 +1354,260 @@
     <p:extLst>
       <p:ext uri="{BB962C8B-B14F-4D97-AF65-F5344CB8AC3E}">
         <p14:creationId xmlns:p14="http://schemas.microsoft.com/office/powerpoint/2010/main" val="2686515754"/>
+      </p:ext>
+    </p:extLst>
+  </p:cSld>
+  <p:clrMapOvr>
+    <a:masterClrMapping/>
+  </p:clrMapOvr>
+</p:notes>
+</file>
+
+<file path=ppt/notesSlides/notesSlide13.xml><?xml version="1.0" encoding="utf-8"?>
+<p:notes xmlns:a="http://schemas.openxmlformats.org/drawingml/2006/main" xmlns:r="http://schemas.openxmlformats.org/officeDocument/2006/relationships" xmlns:p="http://schemas.openxmlformats.org/presentationml/2006/main" showMasterSp="0" showMasterPhAnim="0">
+  <p:cSld>
+    <p:spTree>
+      <p:nvGrpSpPr>
+        <p:cNvPr id="1" name="Shape 114"/>
+        <p:cNvGrpSpPr/>
+        <p:nvPr/>
+      </p:nvGrpSpPr>
+      <p:grpSpPr>
+        <a:xfrm>
+          <a:off x="0" y="0"/>
+          <a:ext cx="0" cy="0"/>
+          <a:chOff x="0" y="0"/>
+          <a:chExt cx="0" cy="0"/>
+        </a:xfrm>
+      </p:grpSpPr>
+      <p:sp>
+        <p:nvSpPr>
+          <p:cNvPr id="115" name="Google Shape;115;p9:notes"/>
+          <p:cNvSpPr txBox="1">
+            <a:spLocks noGrp="1"/>
+          </p:cNvSpPr>
+          <p:nvPr>
+            <p:ph type="body" idx="1"/>
+          </p:nvPr>
+        </p:nvSpPr>
+        <p:spPr>
+          <a:xfrm>
+            <a:off x="685800" y="4343400"/>
+            <a:ext cx="5486400" cy="4114800"/>
+          </a:xfrm>
+          <a:prstGeom prst="rect">
+            <a:avLst/>
+          </a:prstGeom>
+          <a:noFill/>
+          <a:ln>
+            <a:noFill/>
+          </a:ln>
+        </p:spPr>
+        <p:txBody>
+          <a:bodyPr spcFirstLastPara="1" wrap="square" lIns="91425" tIns="91425" rIns="91425" bIns="91425" anchor="t" anchorCtr="0">
+            <a:noAutofit/>
+          </a:bodyPr>
+          <a:lstStyle/>
+          <a:p>
+            <a:pPr marL="0" lvl="0" indent="0" algn="l" rtl="0">
+              <a:lnSpc>
+                <a:spcPct val="100000"/>
+              </a:lnSpc>
+              <a:spcBef>
+                <a:spcPts val="0"/>
+              </a:spcBef>
+              <a:spcAft>
+                <a:spcPts val="0"/>
+              </a:spcAft>
+              <a:buSzPts val="1100"/>
+              <a:buNone/>
+            </a:pPr>
+            <a:endParaRPr/>
+          </a:p>
+        </p:txBody>
+      </p:sp>
+      <p:sp>
+        <p:nvSpPr>
+          <p:cNvPr id="116" name="Google Shape;116;p9:notes"/>
+          <p:cNvSpPr>
+            <a:spLocks noGrp="1" noRot="1" noChangeAspect="1"/>
+          </p:cNvSpPr>
+          <p:nvPr>
+            <p:ph type="sldImg" idx="2"/>
+          </p:nvPr>
+        </p:nvSpPr>
+        <p:spPr>
+          <a:xfrm>
+            <a:off x="381000" y="685800"/>
+            <a:ext cx="6096000" cy="3429000"/>
+          </a:xfrm>
+          <a:custGeom>
+            <a:avLst/>
+            <a:gdLst/>
+            <a:ahLst/>
+            <a:cxnLst/>
+            <a:rect l="l" t="t" r="r" b="b"/>
+            <a:pathLst>
+              <a:path w="120000" h="120000" extrusionOk="0">
+                <a:moveTo>
+                  <a:pt x="0" y="0"/>
+                </a:moveTo>
+                <a:lnTo>
+                  <a:pt x="120000" y="0"/>
+                </a:lnTo>
+                <a:lnTo>
+                  <a:pt x="120000" y="120000"/>
+                </a:lnTo>
+                <a:lnTo>
+                  <a:pt x="0" y="120000"/>
+                </a:lnTo>
+                <a:close/>
+              </a:path>
+            </a:pathLst>
+          </a:custGeom>
+          <a:noFill/>
+          <a:ln w="9525" cap="flat" cmpd="sng">
+            <a:solidFill>
+              <a:srgbClr val="000000"/>
+            </a:solidFill>
+            <a:prstDash val="solid"/>
+            <a:round/>
+            <a:headEnd type="none" w="sm" len="sm"/>
+            <a:tailEnd type="none" w="sm" len="sm"/>
+          </a:ln>
+        </p:spPr>
+      </p:sp>
+    </p:spTree>
+    <p:extLst>
+      <p:ext uri="{BB962C8B-B14F-4D97-AF65-F5344CB8AC3E}">
+        <p14:creationId xmlns:p14="http://schemas.microsoft.com/office/powerpoint/2010/main" val="3200433499"/>
+      </p:ext>
+    </p:extLst>
+  </p:cSld>
+  <p:clrMapOvr>
+    <a:masterClrMapping/>
+  </p:clrMapOvr>
+</p:notes>
+</file>
+
+<file path=ppt/notesSlides/notesSlide14.xml><?xml version="1.0" encoding="utf-8"?>
+<p:notes xmlns:a="http://schemas.openxmlformats.org/drawingml/2006/main" xmlns:r="http://schemas.openxmlformats.org/officeDocument/2006/relationships" xmlns:p="http://schemas.openxmlformats.org/presentationml/2006/main" showMasterSp="0" showMasterPhAnim="0">
+  <p:cSld>
+    <p:spTree>
+      <p:nvGrpSpPr>
+        <p:cNvPr id="1" name="Shape 114"/>
+        <p:cNvGrpSpPr/>
+        <p:nvPr/>
+      </p:nvGrpSpPr>
+      <p:grpSpPr>
+        <a:xfrm>
+          <a:off x="0" y="0"/>
+          <a:ext cx="0" cy="0"/>
+          <a:chOff x="0" y="0"/>
+          <a:chExt cx="0" cy="0"/>
+        </a:xfrm>
+      </p:grpSpPr>
+      <p:sp>
+        <p:nvSpPr>
+          <p:cNvPr id="115" name="Google Shape;115;p9:notes"/>
+          <p:cNvSpPr txBox="1">
+            <a:spLocks noGrp="1"/>
+          </p:cNvSpPr>
+          <p:nvPr>
+            <p:ph type="body" idx="1"/>
+          </p:nvPr>
+        </p:nvSpPr>
+        <p:spPr>
+          <a:xfrm>
+            <a:off x="685800" y="4343400"/>
+            <a:ext cx="5486400" cy="4114800"/>
+          </a:xfrm>
+          <a:prstGeom prst="rect">
+            <a:avLst/>
+          </a:prstGeom>
+          <a:noFill/>
+          <a:ln>
+            <a:noFill/>
+          </a:ln>
+        </p:spPr>
+        <p:txBody>
+          <a:bodyPr spcFirstLastPara="1" wrap="square" lIns="91425" tIns="91425" rIns="91425" bIns="91425" anchor="t" anchorCtr="0">
+            <a:noAutofit/>
+          </a:bodyPr>
+          <a:lstStyle/>
+          <a:p>
+            <a:pPr marL="0" lvl="0" indent="0" algn="l" rtl="0">
+              <a:lnSpc>
+                <a:spcPct val="100000"/>
+              </a:lnSpc>
+              <a:spcBef>
+                <a:spcPts val="0"/>
+              </a:spcBef>
+              <a:spcAft>
+                <a:spcPts val="0"/>
+              </a:spcAft>
+              <a:buSzPts val="1100"/>
+              <a:buNone/>
+            </a:pPr>
+            <a:endParaRPr/>
+          </a:p>
+        </p:txBody>
+      </p:sp>
+      <p:sp>
+        <p:nvSpPr>
+          <p:cNvPr id="116" name="Google Shape;116;p9:notes"/>
+          <p:cNvSpPr>
+            <a:spLocks noGrp="1" noRot="1" noChangeAspect="1"/>
+          </p:cNvSpPr>
+          <p:nvPr>
+            <p:ph type="sldImg" idx="2"/>
+          </p:nvPr>
+        </p:nvSpPr>
+        <p:spPr>
+          <a:xfrm>
+            <a:off x="381000" y="685800"/>
+            <a:ext cx="6096000" cy="3429000"/>
+          </a:xfrm>
+          <a:custGeom>
+            <a:avLst/>
+            <a:gdLst/>
+            <a:ahLst/>
+            <a:cxnLst/>
+            <a:rect l="l" t="t" r="r" b="b"/>
+            <a:pathLst>
+              <a:path w="120000" h="120000" extrusionOk="0">
+                <a:moveTo>
+                  <a:pt x="0" y="0"/>
+                </a:moveTo>
+                <a:lnTo>
+                  <a:pt x="120000" y="0"/>
+                </a:lnTo>
+                <a:lnTo>
+                  <a:pt x="120000" y="120000"/>
+                </a:lnTo>
+                <a:lnTo>
+                  <a:pt x="0" y="120000"/>
+                </a:lnTo>
+                <a:close/>
+              </a:path>
+            </a:pathLst>
+          </a:custGeom>
+          <a:noFill/>
+          <a:ln w="9525" cap="flat" cmpd="sng">
+            <a:solidFill>
+              <a:srgbClr val="000000"/>
+            </a:solidFill>
+            <a:prstDash val="solid"/>
+            <a:round/>
+            <a:headEnd type="none" w="sm" len="sm"/>
+            <a:tailEnd type="none" w="sm" len="sm"/>
+          </a:ln>
+        </p:spPr>
+      </p:sp>
+    </p:spTree>
+    <p:extLst>
+      <p:ext uri="{BB962C8B-B14F-4D97-AF65-F5344CB8AC3E}">
+        <p14:creationId xmlns:p14="http://schemas.microsoft.com/office/powerpoint/2010/main" val="1500974992"/>
       </p:ext>
     </p:extLst>
   </p:cSld>
@@ -9756,6 +10012,288 @@
     <p:extLst>
       <p:ext uri="{BB962C8B-B14F-4D97-AF65-F5344CB8AC3E}">
         <p14:creationId xmlns:p14="http://schemas.microsoft.com/office/powerpoint/2010/main" val="2942173561"/>
+      </p:ext>
+    </p:extLst>
+  </p:cSld>
+  <p:clrMapOvr>
+    <a:masterClrMapping/>
+  </p:clrMapOvr>
+</p:sld>
+</file>
+
+<file path=ppt/slides/slide13.xml><?xml version="1.0" encoding="utf-8"?>
+<p:sld xmlns:a="http://schemas.openxmlformats.org/drawingml/2006/main" xmlns:r="http://schemas.openxmlformats.org/officeDocument/2006/relationships" xmlns:p="http://schemas.openxmlformats.org/presentationml/2006/main">
+  <p:cSld>
+    <p:spTree>
+      <p:nvGrpSpPr>
+        <p:cNvPr id="1" name="Shape 117"/>
+        <p:cNvGrpSpPr/>
+        <p:nvPr/>
+      </p:nvGrpSpPr>
+      <p:grpSpPr>
+        <a:xfrm>
+          <a:off x="0" y="0"/>
+          <a:ext cx="0" cy="0"/>
+          <a:chOff x="0" y="0"/>
+          <a:chExt cx="0" cy="0"/>
+        </a:xfrm>
+      </p:grpSpPr>
+      <p:sp>
+        <p:nvSpPr>
+          <p:cNvPr id="118" name="Google Shape;118;p9"/>
+          <p:cNvSpPr txBox="1">
+            <a:spLocks noGrp="1"/>
+          </p:cNvSpPr>
+          <p:nvPr>
+            <p:ph type="title"/>
+          </p:nvPr>
+        </p:nvSpPr>
+        <p:spPr>
+          <a:xfrm>
+            <a:off x="670249" y="-110736"/>
+            <a:ext cx="9957822" cy="1325563"/>
+          </a:xfrm>
+          <a:prstGeom prst="rect">
+            <a:avLst/>
+          </a:prstGeom>
+          <a:noFill/>
+          <a:ln>
+            <a:noFill/>
+          </a:ln>
+        </p:spPr>
+        <p:txBody>
+          <a:bodyPr spcFirstLastPara="1" wrap="square" lIns="91425" tIns="45700" rIns="91425" bIns="45700" anchor="ctr" anchorCtr="0">
+            <a:normAutofit/>
+          </a:bodyPr>
+          <a:lstStyle/>
+          <a:p>
+            <a:pPr marL="0" lvl="0" indent="0" algn="l" rtl="0">
+              <a:lnSpc>
+                <a:spcPct val="90000"/>
+              </a:lnSpc>
+              <a:spcBef>
+                <a:spcPts val="0"/>
+              </a:spcBef>
+              <a:spcAft>
+                <a:spcPts val="0"/>
+              </a:spcAft>
+              <a:buSzPts val="1800"/>
+              <a:buNone/>
+            </a:pPr>
+            <a:r>
+              <a:rPr lang="pl-PL" sz="3500" dirty="0">
+                <a:latin typeface="Poppins"/>
+                <a:ea typeface="Poppins"/>
+                <a:cs typeface="Poppins"/>
+                <a:sym typeface="Poppins"/>
+              </a:rPr>
+              <a:t>Wnioski</a:t>
+            </a:r>
+            <a:endParaRPr sz="3500" dirty="0">
+              <a:latin typeface="Poppins"/>
+              <a:ea typeface="Poppins"/>
+              <a:cs typeface="Poppins"/>
+              <a:sym typeface="Poppins"/>
+            </a:endParaRPr>
+          </a:p>
+        </p:txBody>
+      </p:sp>
+      <p:sp>
+        <p:nvSpPr>
+          <p:cNvPr id="119" name="Google Shape;119;p9"/>
+          <p:cNvSpPr txBox="1">
+            <a:spLocks noGrp="1"/>
+          </p:cNvSpPr>
+          <p:nvPr>
+            <p:ph type="body" idx="1"/>
+          </p:nvPr>
+        </p:nvSpPr>
+        <p:spPr>
+          <a:xfrm>
+            <a:off x="-54933" y="1330036"/>
+            <a:ext cx="5236534" cy="5276762"/>
+          </a:xfrm>
+          <a:prstGeom prst="rect">
+            <a:avLst/>
+          </a:prstGeom>
+          <a:noFill/>
+          <a:ln>
+            <a:noFill/>
+          </a:ln>
+        </p:spPr>
+        <p:txBody>
+          <a:bodyPr spcFirstLastPara="1" wrap="square" lIns="91425" tIns="45700" rIns="91425" bIns="45700" anchor="t" anchorCtr="0">
+            <a:normAutofit/>
+          </a:bodyPr>
+          <a:lstStyle/>
+          <a:p>
+            <a:pPr marL="571500"/>
+            <a:r>
+              <a:rPr lang="pl-PL" sz="2100" dirty="0">
+                <a:latin typeface="Poppins"/>
+                <a:ea typeface="Poppins"/>
+                <a:cs typeface="Poppins"/>
+                <a:sym typeface="Poppins"/>
+              </a:rPr>
+              <a:t>Błędy krytyczne w aplikacji</a:t>
+            </a:r>
+          </a:p>
+          <a:p>
+            <a:pPr marL="571500"/>
+            <a:r>
+              <a:rPr lang="pl-PL" sz="2100" dirty="0">
+                <a:latin typeface="Poppins"/>
+                <a:ea typeface="Poppins"/>
+                <a:cs typeface="Poppins"/>
+                <a:sym typeface="Poppins"/>
+              </a:rPr>
+              <a:t>Czy aplikacja nadaje się do wydania na produkcję</a:t>
+            </a:r>
+          </a:p>
+          <a:p>
+            <a:pPr marL="571500"/>
+            <a:r>
+              <a:rPr lang="pl-PL" sz="2100" dirty="0">
+                <a:latin typeface="Poppins"/>
+                <a:ea typeface="Poppins"/>
+                <a:cs typeface="Poppins"/>
+                <a:sym typeface="Poppins"/>
+              </a:rPr>
+              <a:t>Dalsze testy aplikacji</a:t>
+            </a:r>
+            <a:endParaRPr lang="en-US" sz="2100" dirty="0">
+              <a:latin typeface="Poppins"/>
+              <a:ea typeface="Poppins"/>
+              <a:cs typeface="Poppins"/>
+              <a:sym typeface="Poppins"/>
+            </a:endParaRPr>
+          </a:p>
+        </p:txBody>
+      </p:sp>
+      <p:pic>
+        <p:nvPicPr>
+          <p:cNvPr id="3" name="Picture 2">
+            <a:extLst>
+              <a:ext uri="{FF2B5EF4-FFF2-40B4-BE49-F238E27FC236}">
+                <a16:creationId xmlns:a16="http://schemas.microsoft.com/office/drawing/2014/main" id="{BDCF1FF1-2A20-47FA-858F-8A085B1F3B3B}"/>
+              </a:ext>
+            </a:extLst>
+          </p:cNvPr>
+          <p:cNvPicPr>
+            <a:picLocks noChangeAspect="1"/>
+          </p:cNvPicPr>
+          <p:nvPr/>
+        </p:nvPicPr>
+        <p:blipFill>
+          <a:blip r:embed="rId3"/>
+          <a:stretch>
+            <a:fillRect/>
+          </a:stretch>
+        </p:blipFill>
+        <p:spPr>
+          <a:xfrm>
+            <a:off x="4495177" y="689827"/>
+            <a:ext cx="7026574" cy="5478346"/>
+          </a:xfrm>
+          <a:prstGeom prst="rect">
+            <a:avLst/>
+          </a:prstGeom>
+        </p:spPr>
+      </p:pic>
+    </p:spTree>
+    <p:extLst>
+      <p:ext uri="{BB962C8B-B14F-4D97-AF65-F5344CB8AC3E}">
+        <p14:creationId xmlns:p14="http://schemas.microsoft.com/office/powerpoint/2010/main" val="2916897301"/>
+      </p:ext>
+    </p:extLst>
+  </p:cSld>
+  <p:clrMapOvr>
+    <a:masterClrMapping/>
+  </p:clrMapOvr>
+</p:sld>
+</file>
+
+<file path=ppt/slides/slide14.xml><?xml version="1.0" encoding="utf-8"?>
+<p:sld xmlns:a="http://schemas.openxmlformats.org/drawingml/2006/main" xmlns:r="http://schemas.openxmlformats.org/officeDocument/2006/relationships" xmlns:p="http://schemas.openxmlformats.org/presentationml/2006/main">
+  <p:cSld>
+    <p:spTree>
+      <p:nvGrpSpPr>
+        <p:cNvPr id="1" name="Shape 117"/>
+        <p:cNvGrpSpPr/>
+        <p:nvPr/>
+      </p:nvGrpSpPr>
+      <p:grpSpPr>
+        <a:xfrm>
+          <a:off x="0" y="0"/>
+          <a:ext cx="0" cy="0"/>
+          <a:chOff x="0" y="0"/>
+          <a:chExt cx="0" cy="0"/>
+        </a:xfrm>
+      </p:grpSpPr>
+      <p:sp>
+        <p:nvSpPr>
+          <p:cNvPr id="118" name="Google Shape;118;p9"/>
+          <p:cNvSpPr txBox="1">
+            <a:spLocks noGrp="1"/>
+          </p:cNvSpPr>
+          <p:nvPr>
+            <p:ph type="title"/>
+          </p:nvPr>
+        </p:nvSpPr>
+        <p:spPr>
+          <a:xfrm>
+            <a:off x="1117089" y="2642854"/>
+            <a:ext cx="9957822" cy="1325563"/>
+          </a:xfrm>
+          <a:prstGeom prst="rect">
+            <a:avLst/>
+          </a:prstGeom>
+          <a:noFill/>
+          <a:ln>
+            <a:noFill/>
+          </a:ln>
+        </p:spPr>
+        <p:txBody>
+          <a:bodyPr spcFirstLastPara="1" wrap="square" lIns="91425" tIns="45700" rIns="91425" bIns="45700" anchor="ctr" anchorCtr="0">
+            <a:normAutofit/>
+          </a:bodyPr>
+          <a:lstStyle/>
+          <a:p>
+            <a:pPr marL="0" lvl="0" indent="0" algn="ctr" rtl="0">
+              <a:lnSpc>
+                <a:spcPct val="90000"/>
+              </a:lnSpc>
+              <a:spcBef>
+                <a:spcPts val="0"/>
+              </a:spcBef>
+              <a:spcAft>
+                <a:spcPts val="0"/>
+              </a:spcAft>
+              <a:buSzPts val="1800"/>
+              <a:buNone/>
+            </a:pPr>
+            <a:r>
+              <a:rPr lang="pl-PL" sz="3500" dirty="0">
+                <a:latin typeface="Poppins"/>
+                <a:ea typeface="Poppins"/>
+                <a:cs typeface="Poppins"/>
+                <a:sym typeface="Poppins"/>
+              </a:rPr>
+              <a:t>Dziękuję za uwagę</a:t>
+            </a:r>
+            <a:endParaRPr sz="3500" dirty="0">
+              <a:latin typeface="Poppins"/>
+              <a:ea typeface="Poppins"/>
+              <a:cs typeface="Poppins"/>
+              <a:sym typeface="Poppins"/>
+            </a:endParaRPr>
+          </a:p>
+        </p:txBody>
+      </p:sp>
+    </p:spTree>
+    <p:extLst>
+      <p:ext uri="{BB962C8B-B14F-4D97-AF65-F5344CB8AC3E}">
+        <p14:creationId xmlns:p14="http://schemas.microsoft.com/office/powerpoint/2010/main" val="2021104700"/>
       </p:ext>
     </p:extLst>
   </p:cSld>

</xml_diff>